<commit_message>
Additional cleaning, final figures, updated citations
</commit_message>
<xml_diff>
--- a/FigureCanvas.pptx
+++ b/FigureCanvas.pptx
@@ -2,12 +2,12 @@
 <file path=ppt/presentation.xml><?xml version="1.0" encoding="utf-8"?>
 <p:presentation xmlns:a="http://schemas.openxmlformats.org/drawingml/2006/main" xmlns:r="http://schemas.openxmlformats.org/officeDocument/2006/relationships" xmlns:p="http://schemas.openxmlformats.org/presentationml/2006/main" saveSubsetFonts="1">
   <p:sldMasterIdLst>
-    <p:sldMasterId id="2147483708" r:id="rId1"/>
+    <p:sldMasterId id="2147483744" r:id="rId1"/>
   </p:sldMasterIdLst>
   <p:sldIdLst>
     <p:sldId id="256" r:id="rId2"/>
   </p:sldIdLst>
-  <p:sldSz cx="10972800" cy="10058400"/>
+  <p:sldSz cx="9601200" cy="9144000"/>
   <p:notesSz cx="6858000" cy="9144000"/>
   <p:defaultTextStyle>
     <a:defPPr>
@@ -141,15 +141,15 @@
         </p:nvSpPr>
         <p:spPr>
           <a:xfrm>
-            <a:off x="822960" y="1646133"/>
-            <a:ext cx="9326880" cy="3501813"/>
+            <a:off x="720090" y="1496484"/>
+            <a:ext cx="8161020" cy="3183467"/>
           </a:xfrm>
         </p:spPr>
         <p:txBody>
           <a:bodyPr anchor="b"/>
           <a:lstStyle>
             <a:lvl1pPr algn="ctr">
-              <a:defRPr sz="7200"/>
+              <a:defRPr sz="6300"/>
             </a:lvl1pPr>
           </a:lstStyle>
           <a:p>
@@ -173,8 +173,8 @@
         </p:nvSpPr>
         <p:spPr>
           <a:xfrm>
-            <a:off x="1371600" y="5282989"/>
-            <a:ext cx="8229600" cy="2428451"/>
+            <a:off x="1200150" y="4802717"/>
+            <a:ext cx="7200900" cy="2207683"/>
           </a:xfrm>
         </p:spPr>
         <p:txBody>
@@ -182,39 +182,39 @@
           <a:lstStyle>
             <a:lvl1pPr marL="0" indent="0" algn="ctr">
               <a:buNone/>
-              <a:defRPr sz="2880"/>
+              <a:defRPr sz="2520"/>
             </a:lvl1pPr>
-            <a:lvl2pPr marL="548640" indent="0" algn="ctr">
-              <a:buNone/>
-              <a:defRPr sz="2400"/>
+            <a:lvl2pPr marL="480060" indent="0" algn="ctr">
+              <a:buNone/>
+              <a:defRPr sz="2100"/>
             </a:lvl2pPr>
-            <a:lvl3pPr marL="1097280" indent="0" algn="ctr">
-              <a:buNone/>
-              <a:defRPr sz="2160"/>
+            <a:lvl3pPr marL="960120" indent="0" algn="ctr">
+              <a:buNone/>
+              <a:defRPr sz="1890"/>
             </a:lvl3pPr>
-            <a:lvl4pPr marL="1645920" indent="0" algn="ctr">
-              <a:buNone/>
-              <a:defRPr sz="1920"/>
+            <a:lvl4pPr marL="1440180" indent="0" algn="ctr">
+              <a:buNone/>
+              <a:defRPr sz="1680"/>
             </a:lvl4pPr>
-            <a:lvl5pPr marL="2194560" indent="0" algn="ctr">
-              <a:buNone/>
-              <a:defRPr sz="1920"/>
+            <a:lvl5pPr marL="1920240" indent="0" algn="ctr">
+              <a:buNone/>
+              <a:defRPr sz="1680"/>
             </a:lvl5pPr>
-            <a:lvl6pPr marL="2743200" indent="0" algn="ctr">
-              <a:buNone/>
-              <a:defRPr sz="1920"/>
+            <a:lvl6pPr marL="2400300" indent="0" algn="ctr">
+              <a:buNone/>
+              <a:defRPr sz="1680"/>
             </a:lvl6pPr>
-            <a:lvl7pPr marL="3291840" indent="0" algn="ctr">
-              <a:buNone/>
-              <a:defRPr sz="1920"/>
+            <a:lvl7pPr marL="2880360" indent="0" algn="ctr">
+              <a:buNone/>
+              <a:defRPr sz="1680"/>
             </a:lvl7pPr>
-            <a:lvl8pPr marL="3840480" indent="0" algn="ctr">
-              <a:buNone/>
-              <a:defRPr sz="1920"/>
+            <a:lvl8pPr marL="3360420" indent="0" algn="ctr">
+              <a:buNone/>
+              <a:defRPr sz="1680"/>
             </a:lvl8pPr>
-            <a:lvl9pPr marL="4389120" indent="0" algn="ctr">
-              <a:buNone/>
-              <a:defRPr sz="1920"/>
+            <a:lvl9pPr marL="3840480" indent="0" algn="ctr">
+              <a:buNone/>
+              <a:defRPr sz="1680"/>
             </a:lvl9pPr>
           </a:lstStyle>
           <a:p>
@@ -294,7 +294,7 @@
     </p:spTree>
     <p:extLst>
       <p:ext uri="{BB962C8B-B14F-4D97-AF65-F5344CB8AC3E}">
-        <p14:creationId xmlns:p14="http://schemas.microsoft.com/office/powerpoint/2010/main" val="789635713"/>
+        <p14:creationId xmlns:p14="http://schemas.microsoft.com/office/powerpoint/2010/main" val="2218369260"/>
       </p:ext>
     </p:extLst>
   </p:cSld>
@@ -464,7 +464,7 @@
     </p:spTree>
     <p:extLst>
       <p:ext uri="{BB962C8B-B14F-4D97-AF65-F5344CB8AC3E}">
-        <p14:creationId xmlns:p14="http://schemas.microsoft.com/office/powerpoint/2010/main" val="2552807067"/>
+        <p14:creationId xmlns:p14="http://schemas.microsoft.com/office/powerpoint/2010/main" val="2301003140"/>
       </p:ext>
     </p:extLst>
   </p:cSld>
@@ -503,8 +503,8 @@
         </p:nvSpPr>
         <p:spPr>
           <a:xfrm>
-            <a:off x="7852411" y="535517"/>
-            <a:ext cx="2366010" cy="8524029"/>
+            <a:off x="6870859" y="486834"/>
+            <a:ext cx="2070259" cy="7749117"/>
           </a:xfrm>
         </p:spPr>
         <p:txBody>
@@ -531,8 +531,8 @@
         </p:nvSpPr>
         <p:spPr>
           <a:xfrm>
-            <a:off x="754381" y="535517"/>
-            <a:ext cx="6960870" cy="8524029"/>
+            <a:off x="660083" y="486834"/>
+            <a:ext cx="6090761" cy="7749117"/>
           </a:xfrm>
         </p:spPr>
         <p:txBody>
@@ -644,7 +644,7 @@
     </p:spTree>
     <p:extLst>
       <p:ext uri="{BB962C8B-B14F-4D97-AF65-F5344CB8AC3E}">
-        <p14:creationId xmlns:p14="http://schemas.microsoft.com/office/powerpoint/2010/main" val="4186736249"/>
+        <p14:creationId xmlns:p14="http://schemas.microsoft.com/office/powerpoint/2010/main" val="1783863832"/>
       </p:ext>
     </p:extLst>
   </p:cSld>
@@ -814,7 +814,7 @@
     </p:spTree>
     <p:extLst>
       <p:ext uri="{BB962C8B-B14F-4D97-AF65-F5344CB8AC3E}">
-        <p14:creationId xmlns:p14="http://schemas.microsoft.com/office/powerpoint/2010/main" val="1508310399"/>
+        <p14:creationId xmlns:p14="http://schemas.microsoft.com/office/powerpoint/2010/main" val="1322576386"/>
       </p:ext>
     </p:extLst>
   </p:cSld>
@@ -853,15 +853,15 @@
         </p:nvSpPr>
         <p:spPr>
           <a:xfrm>
-            <a:off x="748666" y="2507618"/>
-            <a:ext cx="9464040" cy="4184014"/>
+            <a:off x="655082" y="2279653"/>
+            <a:ext cx="8281035" cy="3803649"/>
           </a:xfrm>
         </p:spPr>
         <p:txBody>
           <a:bodyPr anchor="b"/>
           <a:lstStyle>
             <a:lvl1pPr>
-              <a:defRPr sz="7200"/>
+              <a:defRPr sz="6300"/>
             </a:lvl1pPr>
           </a:lstStyle>
           <a:p>
@@ -885,8 +885,8 @@
         </p:nvSpPr>
         <p:spPr>
           <a:xfrm>
-            <a:off x="748666" y="6731215"/>
-            <a:ext cx="9464040" cy="2200274"/>
+            <a:off x="655082" y="6119286"/>
+            <a:ext cx="8281035" cy="2000249"/>
           </a:xfrm>
         </p:spPr>
         <p:txBody>
@@ -894,15 +894,15 @@
           <a:lstStyle>
             <a:lvl1pPr marL="0" indent="0">
               <a:buNone/>
-              <a:defRPr sz="2880">
+              <a:defRPr sz="2520">
                 <a:solidFill>
                   <a:schemeClr val="tx1"/>
                 </a:solidFill>
               </a:defRPr>
             </a:lvl1pPr>
-            <a:lvl2pPr marL="548640" indent="0">
-              <a:buNone/>
-              <a:defRPr sz="2400">
+            <a:lvl2pPr marL="480060" indent="0">
+              <a:buNone/>
+              <a:defRPr sz="2100">
                 <a:solidFill>
                   <a:schemeClr val="tx1">
                     <a:tint val="75000"/>
@@ -910,9 +910,9 @@
                 </a:solidFill>
               </a:defRPr>
             </a:lvl2pPr>
-            <a:lvl3pPr marL="1097280" indent="0">
-              <a:buNone/>
-              <a:defRPr sz="2160">
+            <a:lvl3pPr marL="960120" indent="0">
+              <a:buNone/>
+              <a:defRPr sz="1890">
                 <a:solidFill>
                   <a:schemeClr val="tx1">
                     <a:tint val="75000"/>
@@ -920,9 +920,9 @@
                 </a:solidFill>
               </a:defRPr>
             </a:lvl3pPr>
-            <a:lvl4pPr marL="1645920" indent="0">
-              <a:buNone/>
-              <a:defRPr sz="1920">
+            <a:lvl4pPr marL="1440180" indent="0">
+              <a:buNone/>
+              <a:defRPr sz="1680">
                 <a:solidFill>
                   <a:schemeClr val="tx1">
                     <a:tint val="75000"/>
@@ -930,9 +930,9 @@
                 </a:solidFill>
               </a:defRPr>
             </a:lvl4pPr>
-            <a:lvl5pPr marL="2194560" indent="0">
-              <a:buNone/>
-              <a:defRPr sz="1920">
+            <a:lvl5pPr marL="1920240" indent="0">
+              <a:buNone/>
+              <a:defRPr sz="1680">
                 <a:solidFill>
                   <a:schemeClr val="tx1">
                     <a:tint val="75000"/>
@@ -940,9 +940,9 @@
                 </a:solidFill>
               </a:defRPr>
             </a:lvl5pPr>
-            <a:lvl6pPr marL="2743200" indent="0">
-              <a:buNone/>
-              <a:defRPr sz="1920">
+            <a:lvl6pPr marL="2400300" indent="0">
+              <a:buNone/>
+              <a:defRPr sz="1680">
                 <a:solidFill>
                   <a:schemeClr val="tx1">
                     <a:tint val="75000"/>
@@ -950,9 +950,9 @@
                 </a:solidFill>
               </a:defRPr>
             </a:lvl6pPr>
-            <a:lvl7pPr marL="3291840" indent="0">
-              <a:buNone/>
-              <a:defRPr sz="1920">
+            <a:lvl7pPr marL="2880360" indent="0">
+              <a:buNone/>
+              <a:defRPr sz="1680">
                 <a:solidFill>
                   <a:schemeClr val="tx1">
                     <a:tint val="75000"/>
@@ -960,9 +960,9 @@
                 </a:solidFill>
               </a:defRPr>
             </a:lvl7pPr>
-            <a:lvl8pPr marL="3840480" indent="0">
-              <a:buNone/>
-              <a:defRPr sz="1920">
+            <a:lvl8pPr marL="3360420" indent="0">
+              <a:buNone/>
+              <a:defRPr sz="1680">
                 <a:solidFill>
                   <a:schemeClr val="tx1">
                     <a:tint val="75000"/>
@@ -970,9 +970,9 @@
                 </a:solidFill>
               </a:defRPr>
             </a:lvl8pPr>
-            <a:lvl9pPr marL="4389120" indent="0">
-              <a:buNone/>
-              <a:defRPr sz="1920">
+            <a:lvl9pPr marL="3840480" indent="0">
+              <a:buNone/>
+              <a:defRPr sz="1680">
                 <a:solidFill>
                   <a:schemeClr val="tx1">
                     <a:tint val="75000"/>
@@ -1058,7 +1058,7 @@
     </p:spTree>
     <p:extLst>
       <p:ext uri="{BB962C8B-B14F-4D97-AF65-F5344CB8AC3E}">
-        <p14:creationId xmlns:p14="http://schemas.microsoft.com/office/powerpoint/2010/main" val="3223087371"/>
+        <p14:creationId xmlns:p14="http://schemas.microsoft.com/office/powerpoint/2010/main" val="1728599573"/>
       </p:ext>
     </p:extLst>
   </p:cSld>
@@ -1120,8 +1120,8 @@
         </p:nvSpPr>
         <p:spPr>
           <a:xfrm>
-            <a:off x="754380" y="2677584"/>
-            <a:ext cx="4663440" cy="6381962"/>
+            <a:off x="660083" y="2434167"/>
+            <a:ext cx="4080510" cy="5801784"/>
           </a:xfrm>
         </p:spPr>
         <p:txBody>
@@ -1177,8 +1177,8 @@
         </p:nvSpPr>
         <p:spPr>
           <a:xfrm>
-            <a:off x="5554980" y="2677584"/>
-            <a:ext cx="4663440" cy="6381962"/>
+            <a:off x="4860608" y="2434167"/>
+            <a:ext cx="4080510" cy="5801784"/>
           </a:xfrm>
         </p:spPr>
         <p:txBody>
@@ -1290,7 +1290,7 @@
     </p:spTree>
     <p:extLst>
       <p:ext uri="{BB962C8B-B14F-4D97-AF65-F5344CB8AC3E}">
-        <p14:creationId xmlns:p14="http://schemas.microsoft.com/office/powerpoint/2010/main" val="1571309076"/>
+        <p14:creationId xmlns:p14="http://schemas.microsoft.com/office/powerpoint/2010/main" val="2554332978"/>
       </p:ext>
     </p:extLst>
   </p:cSld>
@@ -1329,8 +1329,8 @@
         </p:nvSpPr>
         <p:spPr>
           <a:xfrm>
-            <a:off x="755809" y="535519"/>
-            <a:ext cx="9464040" cy="1944159"/>
+            <a:off x="661333" y="486836"/>
+            <a:ext cx="8281035" cy="1767417"/>
           </a:xfrm>
         </p:spPr>
         <p:txBody>
@@ -1357,8 +1357,8 @@
         </p:nvSpPr>
         <p:spPr>
           <a:xfrm>
-            <a:off x="755810" y="2465706"/>
-            <a:ext cx="4642008" cy="1208404"/>
+            <a:off x="661334" y="2241551"/>
+            <a:ext cx="4061757" cy="1098549"/>
           </a:xfrm>
         </p:spPr>
         <p:txBody>
@@ -1366,39 +1366,39 @@
           <a:lstStyle>
             <a:lvl1pPr marL="0" indent="0">
               <a:buNone/>
-              <a:defRPr sz="2880" b="1"/>
+              <a:defRPr sz="2520" b="1"/>
             </a:lvl1pPr>
-            <a:lvl2pPr marL="548640" indent="0">
-              <a:buNone/>
-              <a:defRPr sz="2400" b="1"/>
+            <a:lvl2pPr marL="480060" indent="0">
+              <a:buNone/>
+              <a:defRPr sz="2100" b="1"/>
             </a:lvl2pPr>
-            <a:lvl3pPr marL="1097280" indent="0">
-              <a:buNone/>
-              <a:defRPr sz="2160" b="1"/>
+            <a:lvl3pPr marL="960120" indent="0">
+              <a:buNone/>
+              <a:defRPr sz="1890" b="1"/>
             </a:lvl3pPr>
-            <a:lvl4pPr marL="1645920" indent="0">
-              <a:buNone/>
-              <a:defRPr sz="1920" b="1"/>
+            <a:lvl4pPr marL="1440180" indent="0">
+              <a:buNone/>
+              <a:defRPr sz="1680" b="1"/>
             </a:lvl4pPr>
-            <a:lvl5pPr marL="2194560" indent="0">
-              <a:buNone/>
-              <a:defRPr sz="1920" b="1"/>
+            <a:lvl5pPr marL="1920240" indent="0">
+              <a:buNone/>
+              <a:defRPr sz="1680" b="1"/>
             </a:lvl5pPr>
-            <a:lvl6pPr marL="2743200" indent="0">
-              <a:buNone/>
-              <a:defRPr sz="1920" b="1"/>
+            <a:lvl6pPr marL="2400300" indent="0">
+              <a:buNone/>
+              <a:defRPr sz="1680" b="1"/>
             </a:lvl6pPr>
-            <a:lvl7pPr marL="3291840" indent="0">
-              <a:buNone/>
-              <a:defRPr sz="1920" b="1"/>
+            <a:lvl7pPr marL="2880360" indent="0">
+              <a:buNone/>
+              <a:defRPr sz="1680" b="1"/>
             </a:lvl7pPr>
-            <a:lvl8pPr marL="3840480" indent="0">
-              <a:buNone/>
-              <a:defRPr sz="1920" b="1"/>
+            <a:lvl8pPr marL="3360420" indent="0">
+              <a:buNone/>
+              <a:defRPr sz="1680" b="1"/>
             </a:lvl8pPr>
-            <a:lvl9pPr marL="4389120" indent="0">
-              <a:buNone/>
-              <a:defRPr sz="1920" b="1"/>
+            <a:lvl9pPr marL="3840480" indent="0">
+              <a:buNone/>
+              <a:defRPr sz="1680" b="1"/>
             </a:lvl9pPr>
           </a:lstStyle>
           <a:p>
@@ -1422,8 +1422,8 @@
         </p:nvSpPr>
         <p:spPr>
           <a:xfrm>
-            <a:off x="755810" y="3674110"/>
-            <a:ext cx="4642008" cy="5404062"/>
+            <a:off x="661334" y="3340100"/>
+            <a:ext cx="4061757" cy="4912784"/>
           </a:xfrm>
         </p:spPr>
         <p:txBody>
@@ -1479,8 +1479,8 @@
         </p:nvSpPr>
         <p:spPr>
           <a:xfrm>
-            <a:off x="5554981" y="2465706"/>
-            <a:ext cx="4664869" cy="1208404"/>
+            <a:off x="4860608" y="2241551"/>
+            <a:ext cx="4081761" cy="1098549"/>
           </a:xfrm>
         </p:spPr>
         <p:txBody>
@@ -1488,39 +1488,39 @@
           <a:lstStyle>
             <a:lvl1pPr marL="0" indent="0">
               <a:buNone/>
-              <a:defRPr sz="2880" b="1"/>
+              <a:defRPr sz="2520" b="1"/>
             </a:lvl1pPr>
-            <a:lvl2pPr marL="548640" indent="0">
-              <a:buNone/>
-              <a:defRPr sz="2400" b="1"/>
+            <a:lvl2pPr marL="480060" indent="0">
+              <a:buNone/>
+              <a:defRPr sz="2100" b="1"/>
             </a:lvl2pPr>
-            <a:lvl3pPr marL="1097280" indent="0">
-              <a:buNone/>
-              <a:defRPr sz="2160" b="1"/>
+            <a:lvl3pPr marL="960120" indent="0">
+              <a:buNone/>
+              <a:defRPr sz="1890" b="1"/>
             </a:lvl3pPr>
-            <a:lvl4pPr marL="1645920" indent="0">
-              <a:buNone/>
-              <a:defRPr sz="1920" b="1"/>
+            <a:lvl4pPr marL="1440180" indent="0">
+              <a:buNone/>
+              <a:defRPr sz="1680" b="1"/>
             </a:lvl4pPr>
-            <a:lvl5pPr marL="2194560" indent="0">
-              <a:buNone/>
-              <a:defRPr sz="1920" b="1"/>
+            <a:lvl5pPr marL="1920240" indent="0">
+              <a:buNone/>
+              <a:defRPr sz="1680" b="1"/>
             </a:lvl5pPr>
-            <a:lvl6pPr marL="2743200" indent="0">
-              <a:buNone/>
-              <a:defRPr sz="1920" b="1"/>
+            <a:lvl6pPr marL="2400300" indent="0">
+              <a:buNone/>
+              <a:defRPr sz="1680" b="1"/>
             </a:lvl6pPr>
-            <a:lvl7pPr marL="3291840" indent="0">
-              <a:buNone/>
-              <a:defRPr sz="1920" b="1"/>
+            <a:lvl7pPr marL="2880360" indent="0">
+              <a:buNone/>
+              <a:defRPr sz="1680" b="1"/>
             </a:lvl7pPr>
-            <a:lvl8pPr marL="3840480" indent="0">
-              <a:buNone/>
-              <a:defRPr sz="1920" b="1"/>
+            <a:lvl8pPr marL="3360420" indent="0">
+              <a:buNone/>
+              <a:defRPr sz="1680" b="1"/>
             </a:lvl8pPr>
-            <a:lvl9pPr marL="4389120" indent="0">
-              <a:buNone/>
-              <a:defRPr sz="1920" b="1"/>
+            <a:lvl9pPr marL="3840480" indent="0">
+              <a:buNone/>
+              <a:defRPr sz="1680" b="1"/>
             </a:lvl9pPr>
           </a:lstStyle>
           <a:p>
@@ -1544,8 +1544,8 @@
         </p:nvSpPr>
         <p:spPr>
           <a:xfrm>
-            <a:off x="5554981" y="3674110"/>
-            <a:ext cx="4664869" cy="5404062"/>
+            <a:off x="4860608" y="3340100"/>
+            <a:ext cx="4081761" cy="4912784"/>
           </a:xfrm>
         </p:spPr>
         <p:txBody>
@@ -1657,7 +1657,7 @@
     </p:spTree>
     <p:extLst>
       <p:ext uri="{BB962C8B-B14F-4D97-AF65-F5344CB8AC3E}">
-        <p14:creationId xmlns:p14="http://schemas.microsoft.com/office/powerpoint/2010/main" val="2396543678"/>
+        <p14:creationId xmlns:p14="http://schemas.microsoft.com/office/powerpoint/2010/main" val="1097951630"/>
       </p:ext>
     </p:extLst>
   </p:cSld>
@@ -1775,7 +1775,7 @@
     </p:spTree>
     <p:extLst>
       <p:ext uri="{BB962C8B-B14F-4D97-AF65-F5344CB8AC3E}">
-        <p14:creationId xmlns:p14="http://schemas.microsoft.com/office/powerpoint/2010/main" val="3328077884"/>
+        <p14:creationId xmlns:p14="http://schemas.microsoft.com/office/powerpoint/2010/main" val="1813668851"/>
       </p:ext>
     </p:extLst>
   </p:cSld>
@@ -1870,7 +1870,7 @@
     </p:spTree>
     <p:extLst>
       <p:ext uri="{BB962C8B-B14F-4D97-AF65-F5344CB8AC3E}">
-        <p14:creationId xmlns:p14="http://schemas.microsoft.com/office/powerpoint/2010/main" val="2371110487"/>
+        <p14:creationId xmlns:p14="http://schemas.microsoft.com/office/powerpoint/2010/main" val="3425716207"/>
       </p:ext>
     </p:extLst>
   </p:cSld>
@@ -1909,15 +1909,15 @@
         </p:nvSpPr>
         <p:spPr>
           <a:xfrm>
-            <a:off x="755809" y="670560"/>
-            <a:ext cx="3539014" cy="2346960"/>
+            <a:off x="661333" y="609600"/>
+            <a:ext cx="3096637" cy="2133600"/>
           </a:xfrm>
         </p:spPr>
         <p:txBody>
           <a:bodyPr anchor="b"/>
           <a:lstStyle>
             <a:lvl1pPr>
-              <a:defRPr sz="3840"/>
+              <a:defRPr sz="3360"/>
             </a:lvl1pPr>
           </a:lstStyle>
           <a:p>
@@ -1941,39 +1941,39 @@
         </p:nvSpPr>
         <p:spPr>
           <a:xfrm>
-            <a:off x="4664869" y="1448226"/>
-            <a:ext cx="5554980" cy="7147983"/>
+            <a:off x="4081760" y="1316569"/>
+            <a:ext cx="4860608" cy="6498167"/>
           </a:xfrm>
         </p:spPr>
         <p:txBody>
           <a:bodyPr/>
           <a:lstStyle>
             <a:lvl1pPr>
-              <a:defRPr sz="3840"/>
+              <a:defRPr sz="3360"/>
             </a:lvl1pPr>
             <a:lvl2pPr>
-              <a:defRPr sz="3360"/>
+              <a:defRPr sz="2940"/>
             </a:lvl2pPr>
             <a:lvl3pPr>
-              <a:defRPr sz="2880"/>
+              <a:defRPr sz="2520"/>
             </a:lvl3pPr>
             <a:lvl4pPr>
-              <a:defRPr sz="2400"/>
+              <a:defRPr sz="2100"/>
             </a:lvl4pPr>
             <a:lvl5pPr>
-              <a:defRPr sz="2400"/>
+              <a:defRPr sz="2100"/>
             </a:lvl5pPr>
             <a:lvl6pPr>
-              <a:defRPr sz="2400"/>
+              <a:defRPr sz="2100"/>
             </a:lvl6pPr>
             <a:lvl7pPr>
-              <a:defRPr sz="2400"/>
+              <a:defRPr sz="2100"/>
             </a:lvl7pPr>
             <a:lvl8pPr>
-              <a:defRPr sz="2400"/>
+              <a:defRPr sz="2100"/>
             </a:lvl8pPr>
             <a:lvl9pPr>
-              <a:defRPr sz="2400"/>
+              <a:defRPr sz="2100"/>
             </a:lvl9pPr>
           </a:lstStyle>
           <a:p>
@@ -2026,8 +2026,8 @@
         </p:nvSpPr>
         <p:spPr>
           <a:xfrm>
-            <a:off x="755809" y="3017520"/>
-            <a:ext cx="3539014" cy="5590329"/>
+            <a:off x="661333" y="2743200"/>
+            <a:ext cx="3096637" cy="5082117"/>
           </a:xfrm>
         </p:spPr>
         <p:txBody>
@@ -2035,39 +2035,39 @@
           <a:lstStyle>
             <a:lvl1pPr marL="0" indent="0">
               <a:buNone/>
-              <a:defRPr sz="1920"/>
+              <a:defRPr sz="1680"/>
             </a:lvl1pPr>
-            <a:lvl2pPr marL="548640" indent="0">
-              <a:buNone/>
-              <a:defRPr sz="1680"/>
+            <a:lvl2pPr marL="480060" indent="0">
+              <a:buNone/>
+              <a:defRPr sz="1470"/>
             </a:lvl2pPr>
-            <a:lvl3pPr marL="1097280" indent="0">
-              <a:buNone/>
-              <a:defRPr sz="1440"/>
+            <a:lvl3pPr marL="960120" indent="0">
+              <a:buNone/>
+              <a:defRPr sz="1260"/>
             </a:lvl3pPr>
-            <a:lvl4pPr marL="1645920" indent="0">
-              <a:buNone/>
-              <a:defRPr sz="1200"/>
+            <a:lvl4pPr marL="1440180" indent="0">
+              <a:buNone/>
+              <a:defRPr sz="1050"/>
             </a:lvl4pPr>
-            <a:lvl5pPr marL="2194560" indent="0">
-              <a:buNone/>
-              <a:defRPr sz="1200"/>
+            <a:lvl5pPr marL="1920240" indent="0">
+              <a:buNone/>
+              <a:defRPr sz="1050"/>
             </a:lvl5pPr>
-            <a:lvl6pPr marL="2743200" indent="0">
-              <a:buNone/>
-              <a:defRPr sz="1200"/>
+            <a:lvl6pPr marL="2400300" indent="0">
+              <a:buNone/>
+              <a:defRPr sz="1050"/>
             </a:lvl6pPr>
-            <a:lvl7pPr marL="3291840" indent="0">
-              <a:buNone/>
-              <a:defRPr sz="1200"/>
+            <a:lvl7pPr marL="2880360" indent="0">
+              <a:buNone/>
+              <a:defRPr sz="1050"/>
             </a:lvl7pPr>
-            <a:lvl8pPr marL="3840480" indent="0">
-              <a:buNone/>
-              <a:defRPr sz="1200"/>
+            <a:lvl8pPr marL="3360420" indent="0">
+              <a:buNone/>
+              <a:defRPr sz="1050"/>
             </a:lvl8pPr>
-            <a:lvl9pPr marL="4389120" indent="0">
-              <a:buNone/>
-              <a:defRPr sz="1200"/>
+            <a:lvl9pPr marL="3840480" indent="0">
+              <a:buNone/>
+              <a:defRPr sz="1050"/>
             </a:lvl9pPr>
           </a:lstStyle>
           <a:p>
@@ -2147,7 +2147,7 @@
     </p:spTree>
     <p:extLst>
       <p:ext uri="{BB962C8B-B14F-4D97-AF65-F5344CB8AC3E}">
-        <p14:creationId xmlns:p14="http://schemas.microsoft.com/office/powerpoint/2010/main" val="1667086590"/>
+        <p14:creationId xmlns:p14="http://schemas.microsoft.com/office/powerpoint/2010/main" val="1629603006"/>
       </p:ext>
     </p:extLst>
   </p:cSld>
@@ -2186,15 +2186,15 @@
         </p:nvSpPr>
         <p:spPr>
           <a:xfrm>
-            <a:off x="755809" y="670560"/>
-            <a:ext cx="3539014" cy="2346960"/>
+            <a:off x="661333" y="609600"/>
+            <a:ext cx="3096637" cy="2133600"/>
           </a:xfrm>
         </p:spPr>
         <p:txBody>
           <a:bodyPr anchor="b"/>
           <a:lstStyle>
             <a:lvl1pPr>
-              <a:defRPr sz="3840"/>
+              <a:defRPr sz="3360"/>
             </a:lvl1pPr>
           </a:lstStyle>
           <a:p>
@@ -2218,8 +2218,8 @@
         </p:nvSpPr>
         <p:spPr>
           <a:xfrm>
-            <a:off x="4664869" y="1448226"/>
-            <a:ext cx="5554980" cy="7147983"/>
+            <a:off x="4081760" y="1316569"/>
+            <a:ext cx="4860608" cy="6498167"/>
           </a:xfrm>
         </p:spPr>
         <p:txBody>
@@ -2227,39 +2227,39 @@
           <a:lstStyle>
             <a:lvl1pPr marL="0" indent="0">
               <a:buNone/>
-              <a:defRPr sz="3840"/>
+              <a:defRPr sz="3360"/>
             </a:lvl1pPr>
-            <a:lvl2pPr marL="548640" indent="0">
-              <a:buNone/>
-              <a:defRPr sz="3360"/>
+            <a:lvl2pPr marL="480060" indent="0">
+              <a:buNone/>
+              <a:defRPr sz="2940"/>
             </a:lvl2pPr>
-            <a:lvl3pPr marL="1097280" indent="0">
-              <a:buNone/>
-              <a:defRPr sz="2880"/>
+            <a:lvl3pPr marL="960120" indent="0">
+              <a:buNone/>
+              <a:defRPr sz="2520"/>
             </a:lvl3pPr>
-            <a:lvl4pPr marL="1645920" indent="0">
-              <a:buNone/>
-              <a:defRPr sz="2400"/>
+            <a:lvl4pPr marL="1440180" indent="0">
+              <a:buNone/>
+              <a:defRPr sz="2100"/>
             </a:lvl4pPr>
-            <a:lvl5pPr marL="2194560" indent="0">
-              <a:buNone/>
-              <a:defRPr sz="2400"/>
+            <a:lvl5pPr marL="1920240" indent="0">
+              <a:buNone/>
+              <a:defRPr sz="2100"/>
             </a:lvl5pPr>
-            <a:lvl6pPr marL="2743200" indent="0">
-              <a:buNone/>
-              <a:defRPr sz="2400"/>
+            <a:lvl6pPr marL="2400300" indent="0">
+              <a:buNone/>
+              <a:defRPr sz="2100"/>
             </a:lvl6pPr>
-            <a:lvl7pPr marL="3291840" indent="0">
-              <a:buNone/>
-              <a:defRPr sz="2400"/>
+            <a:lvl7pPr marL="2880360" indent="0">
+              <a:buNone/>
+              <a:defRPr sz="2100"/>
             </a:lvl7pPr>
-            <a:lvl8pPr marL="3840480" indent="0">
-              <a:buNone/>
-              <a:defRPr sz="2400"/>
+            <a:lvl8pPr marL="3360420" indent="0">
+              <a:buNone/>
+              <a:defRPr sz="2100"/>
             </a:lvl8pPr>
-            <a:lvl9pPr marL="4389120" indent="0">
-              <a:buNone/>
-              <a:defRPr sz="2400"/>
+            <a:lvl9pPr marL="3840480" indent="0">
+              <a:buNone/>
+              <a:defRPr sz="2100"/>
             </a:lvl9pPr>
           </a:lstStyle>
           <a:p>
@@ -2283,8 +2283,8 @@
         </p:nvSpPr>
         <p:spPr>
           <a:xfrm>
-            <a:off x="755809" y="3017520"/>
-            <a:ext cx="3539014" cy="5590329"/>
+            <a:off x="661333" y="2743200"/>
+            <a:ext cx="3096637" cy="5082117"/>
           </a:xfrm>
         </p:spPr>
         <p:txBody>
@@ -2292,39 +2292,39 @@
           <a:lstStyle>
             <a:lvl1pPr marL="0" indent="0">
               <a:buNone/>
-              <a:defRPr sz="1920"/>
+              <a:defRPr sz="1680"/>
             </a:lvl1pPr>
-            <a:lvl2pPr marL="548640" indent="0">
-              <a:buNone/>
-              <a:defRPr sz="1680"/>
+            <a:lvl2pPr marL="480060" indent="0">
+              <a:buNone/>
+              <a:defRPr sz="1470"/>
             </a:lvl2pPr>
-            <a:lvl3pPr marL="1097280" indent="0">
-              <a:buNone/>
-              <a:defRPr sz="1440"/>
+            <a:lvl3pPr marL="960120" indent="0">
+              <a:buNone/>
+              <a:defRPr sz="1260"/>
             </a:lvl3pPr>
-            <a:lvl4pPr marL="1645920" indent="0">
-              <a:buNone/>
-              <a:defRPr sz="1200"/>
+            <a:lvl4pPr marL="1440180" indent="0">
+              <a:buNone/>
+              <a:defRPr sz="1050"/>
             </a:lvl4pPr>
-            <a:lvl5pPr marL="2194560" indent="0">
-              <a:buNone/>
-              <a:defRPr sz="1200"/>
+            <a:lvl5pPr marL="1920240" indent="0">
+              <a:buNone/>
+              <a:defRPr sz="1050"/>
             </a:lvl5pPr>
-            <a:lvl6pPr marL="2743200" indent="0">
-              <a:buNone/>
-              <a:defRPr sz="1200"/>
+            <a:lvl6pPr marL="2400300" indent="0">
+              <a:buNone/>
+              <a:defRPr sz="1050"/>
             </a:lvl6pPr>
-            <a:lvl7pPr marL="3291840" indent="0">
-              <a:buNone/>
-              <a:defRPr sz="1200"/>
+            <a:lvl7pPr marL="2880360" indent="0">
+              <a:buNone/>
+              <a:defRPr sz="1050"/>
             </a:lvl7pPr>
-            <a:lvl8pPr marL="3840480" indent="0">
-              <a:buNone/>
-              <a:defRPr sz="1200"/>
+            <a:lvl8pPr marL="3360420" indent="0">
+              <a:buNone/>
+              <a:defRPr sz="1050"/>
             </a:lvl8pPr>
-            <a:lvl9pPr marL="4389120" indent="0">
-              <a:buNone/>
-              <a:defRPr sz="1200"/>
+            <a:lvl9pPr marL="3840480" indent="0">
+              <a:buNone/>
+              <a:defRPr sz="1050"/>
             </a:lvl9pPr>
           </a:lstStyle>
           <a:p>
@@ -2404,7 +2404,7 @@
     </p:spTree>
     <p:extLst>
       <p:ext uri="{BB962C8B-B14F-4D97-AF65-F5344CB8AC3E}">
-        <p14:creationId xmlns:p14="http://schemas.microsoft.com/office/powerpoint/2010/main" val="3465618748"/>
+        <p14:creationId xmlns:p14="http://schemas.microsoft.com/office/powerpoint/2010/main" val="3395454572"/>
       </p:ext>
     </p:extLst>
   </p:cSld>
@@ -2448,8 +2448,8 @@
         </p:nvSpPr>
         <p:spPr>
           <a:xfrm>
-            <a:off x="754380" y="535519"/>
-            <a:ext cx="9464040" cy="1944159"/>
+            <a:off x="660083" y="486836"/>
+            <a:ext cx="8281035" cy="1767417"/>
           </a:xfrm>
           <a:prstGeom prst="rect">
             <a:avLst/>
@@ -2481,8 +2481,8 @@
         </p:nvSpPr>
         <p:spPr>
           <a:xfrm>
-            <a:off x="754380" y="2677584"/>
-            <a:ext cx="9464040" cy="6381962"/>
+            <a:off x="660083" y="2434167"/>
+            <a:ext cx="8281035" cy="5801784"/>
           </a:xfrm>
           <a:prstGeom prst="rect">
             <a:avLst/>
@@ -2543,8 +2543,8 @@
         </p:nvSpPr>
         <p:spPr>
           <a:xfrm>
-            <a:off x="754380" y="9322649"/>
-            <a:ext cx="2468880" cy="535517"/>
+            <a:off x="660083" y="8475136"/>
+            <a:ext cx="2160270" cy="486833"/>
           </a:xfrm>
           <a:prstGeom prst="rect">
             <a:avLst/>
@@ -2554,7 +2554,7 @@
           <a:bodyPr vert="horz" lIns="91440" tIns="45720" rIns="91440" bIns="45720" rtlCol="0" anchor="ctr"/>
           <a:lstStyle>
             <a:lvl1pPr algn="l">
-              <a:defRPr sz="1440">
+              <a:defRPr sz="1260">
                 <a:solidFill>
                   <a:schemeClr val="tx1">
                     <a:tint val="75000"/>
@@ -2584,8 +2584,8 @@
         </p:nvSpPr>
         <p:spPr>
           <a:xfrm>
-            <a:off x="3634740" y="9322649"/>
-            <a:ext cx="3703320" cy="535517"/>
+            <a:off x="3180398" y="8475136"/>
+            <a:ext cx="3240405" cy="486833"/>
           </a:xfrm>
           <a:prstGeom prst="rect">
             <a:avLst/>
@@ -2595,7 +2595,7 @@
           <a:bodyPr vert="horz" lIns="91440" tIns="45720" rIns="91440" bIns="45720" rtlCol="0" anchor="ctr"/>
           <a:lstStyle>
             <a:lvl1pPr algn="ctr">
-              <a:defRPr sz="1440">
+              <a:defRPr sz="1260">
                 <a:solidFill>
                   <a:schemeClr val="tx1">
                     <a:tint val="75000"/>
@@ -2621,8 +2621,8 @@
         </p:nvSpPr>
         <p:spPr>
           <a:xfrm>
-            <a:off x="7749540" y="9322649"/>
-            <a:ext cx="2468880" cy="535517"/>
+            <a:off x="6780848" y="8475136"/>
+            <a:ext cx="2160270" cy="486833"/>
           </a:xfrm>
           <a:prstGeom prst="rect">
             <a:avLst/>
@@ -2632,7 +2632,7 @@
           <a:bodyPr vert="horz" lIns="91440" tIns="45720" rIns="91440" bIns="45720" rtlCol="0" anchor="ctr"/>
           <a:lstStyle>
             <a:lvl1pPr algn="r">
-              <a:defRPr sz="1440">
+              <a:defRPr sz="1260">
                 <a:solidFill>
                   <a:schemeClr val="tx1">
                     <a:tint val="75000"/>
@@ -2653,27 +2653,27 @@
     </p:spTree>
     <p:extLst>
       <p:ext uri="{BB962C8B-B14F-4D97-AF65-F5344CB8AC3E}">
-        <p14:creationId xmlns:p14="http://schemas.microsoft.com/office/powerpoint/2010/main" val="2661983412"/>
+        <p14:creationId xmlns:p14="http://schemas.microsoft.com/office/powerpoint/2010/main" val="1093503372"/>
       </p:ext>
     </p:extLst>
   </p:cSld>
   <p:clrMap bg1="lt1" tx1="dk1" bg2="lt2" tx2="dk2" accent1="accent1" accent2="accent2" accent3="accent3" accent4="accent4" accent5="accent5" accent6="accent6" hlink="hlink" folHlink="folHlink"/>
   <p:sldLayoutIdLst>
-    <p:sldLayoutId id="2147483709" r:id="rId1"/>
-    <p:sldLayoutId id="2147483710" r:id="rId2"/>
-    <p:sldLayoutId id="2147483711" r:id="rId3"/>
-    <p:sldLayoutId id="2147483712" r:id="rId4"/>
-    <p:sldLayoutId id="2147483713" r:id="rId5"/>
-    <p:sldLayoutId id="2147483714" r:id="rId6"/>
-    <p:sldLayoutId id="2147483715" r:id="rId7"/>
-    <p:sldLayoutId id="2147483716" r:id="rId8"/>
-    <p:sldLayoutId id="2147483717" r:id="rId9"/>
-    <p:sldLayoutId id="2147483718" r:id="rId10"/>
-    <p:sldLayoutId id="2147483719" r:id="rId11"/>
+    <p:sldLayoutId id="2147483745" r:id="rId1"/>
+    <p:sldLayoutId id="2147483746" r:id="rId2"/>
+    <p:sldLayoutId id="2147483747" r:id="rId3"/>
+    <p:sldLayoutId id="2147483748" r:id="rId4"/>
+    <p:sldLayoutId id="2147483749" r:id="rId5"/>
+    <p:sldLayoutId id="2147483750" r:id="rId6"/>
+    <p:sldLayoutId id="2147483751" r:id="rId7"/>
+    <p:sldLayoutId id="2147483752" r:id="rId8"/>
+    <p:sldLayoutId id="2147483753" r:id="rId9"/>
+    <p:sldLayoutId id="2147483754" r:id="rId10"/>
+    <p:sldLayoutId id="2147483755" r:id="rId11"/>
   </p:sldLayoutIdLst>
   <p:txStyles>
     <p:titleStyle>
-      <a:lvl1pPr algn="l" defTabSz="1097280" rtl="0" eaLnBrk="1" latinLnBrk="0" hangingPunct="1">
+      <a:lvl1pPr algn="l" defTabSz="960120" rtl="0" eaLnBrk="1" latinLnBrk="0" hangingPunct="1">
         <a:lnSpc>
           <a:spcPct val="90000"/>
         </a:lnSpc>
@@ -2681,7 +2681,7 @@
           <a:spcPct val="0"/>
         </a:spcBef>
         <a:buNone/>
-        <a:defRPr sz="5280" kern="1200">
+        <a:defRPr sz="4620" kern="1200">
           <a:solidFill>
             <a:schemeClr val="tx1"/>
           </a:solidFill>
@@ -2692,16 +2692,16 @@
       </a:lvl1pPr>
     </p:titleStyle>
     <p:bodyStyle>
-      <a:lvl1pPr marL="274320" indent="-274320" algn="l" defTabSz="1097280" rtl="0" eaLnBrk="1" latinLnBrk="0" hangingPunct="1">
+      <a:lvl1pPr marL="240030" indent="-240030" algn="l" defTabSz="960120" rtl="0" eaLnBrk="1" latinLnBrk="0" hangingPunct="1">
         <a:lnSpc>
           <a:spcPct val="90000"/>
         </a:lnSpc>
         <a:spcBef>
-          <a:spcPts val="1200"/>
+          <a:spcPts val="1050"/>
         </a:spcBef>
         <a:buFont typeface="Arial" panose="020B0604020202020204" pitchFamily="34" charset="0"/>
         <a:buChar char="•"/>
-        <a:defRPr sz="3360" kern="1200">
+        <a:defRPr sz="2940" kern="1200">
           <a:solidFill>
             <a:schemeClr val="tx1"/>
           </a:solidFill>
@@ -2710,16 +2710,16 @@
           <a:cs typeface="+mn-cs"/>
         </a:defRPr>
       </a:lvl1pPr>
-      <a:lvl2pPr marL="822960" indent="-274320" algn="l" defTabSz="1097280" rtl="0" eaLnBrk="1" latinLnBrk="0" hangingPunct="1">
+      <a:lvl2pPr marL="720090" indent="-240030" algn="l" defTabSz="960120" rtl="0" eaLnBrk="1" latinLnBrk="0" hangingPunct="1">
         <a:lnSpc>
           <a:spcPct val="90000"/>
         </a:lnSpc>
         <a:spcBef>
-          <a:spcPts val="600"/>
+          <a:spcPts val="525"/>
         </a:spcBef>
         <a:buFont typeface="Arial" panose="020B0604020202020204" pitchFamily="34" charset="0"/>
         <a:buChar char="•"/>
-        <a:defRPr sz="2880" kern="1200">
+        <a:defRPr sz="2520" kern="1200">
           <a:solidFill>
             <a:schemeClr val="tx1"/>
           </a:solidFill>
@@ -2728,16 +2728,16 @@
           <a:cs typeface="+mn-cs"/>
         </a:defRPr>
       </a:lvl2pPr>
-      <a:lvl3pPr marL="1371600" indent="-274320" algn="l" defTabSz="1097280" rtl="0" eaLnBrk="1" latinLnBrk="0" hangingPunct="1">
+      <a:lvl3pPr marL="1200150" indent="-240030" algn="l" defTabSz="960120" rtl="0" eaLnBrk="1" latinLnBrk="0" hangingPunct="1">
         <a:lnSpc>
           <a:spcPct val="90000"/>
         </a:lnSpc>
         <a:spcBef>
-          <a:spcPts val="600"/>
+          <a:spcPts val="525"/>
         </a:spcBef>
         <a:buFont typeface="Arial" panose="020B0604020202020204" pitchFamily="34" charset="0"/>
         <a:buChar char="•"/>
-        <a:defRPr sz="2400" kern="1200">
+        <a:defRPr sz="2100" kern="1200">
           <a:solidFill>
             <a:schemeClr val="tx1"/>
           </a:solidFill>
@@ -2746,16 +2746,16 @@
           <a:cs typeface="+mn-cs"/>
         </a:defRPr>
       </a:lvl3pPr>
-      <a:lvl4pPr marL="1920240" indent="-274320" algn="l" defTabSz="1097280" rtl="0" eaLnBrk="1" latinLnBrk="0" hangingPunct="1">
+      <a:lvl4pPr marL="1680210" indent="-240030" algn="l" defTabSz="960120" rtl="0" eaLnBrk="1" latinLnBrk="0" hangingPunct="1">
         <a:lnSpc>
           <a:spcPct val="90000"/>
         </a:lnSpc>
         <a:spcBef>
-          <a:spcPts val="600"/>
+          <a:spcPts val="525"/>
         </a:spcBef>
         <a:buFont typeface="Arial" panose="020B0604020202020204" pitchFamily="34" charset="0"/>
         <a:buChar char="•"/>
-        <a:defRPr sz="2160" kern="1200">
+        <a:defRPr sz="1890" kern="1200">
           <a:solidFill>
             <a:schemeClr val="tx1"/>
           </a:solidFill>
@@ -2764,16 +2764,16 @@
           <a:cs typeface="+mn-cs"/>
         </a:defRPr>
       </a:lvl4pPr>
-      <a:lvl5pPr marL="2468880" indent="-274320" algn="l" defTabSz="1097280" rtl="0" eaLnBrk="1" latinLnBrk="0" hangingPunct="1">
+      <a:lvl5pPr marL="2160270" indent="-240030" algn="l" defTabSz="960120" rtl="0" eaLnBrk="1" latinLnBrk="0" hangingPunct="1">
         <a:lnSpc>
           <a:spcPct val="90000"/>
         </a:lnSpc>
         <a:spcBef>
-          <a:spcPts val="600"/>
+          <a:spcPts val="525"/>
         </a:spcBef>
         <a:buFont typeface="Arial" panose="020B0604020202020204" pitchFamily="34" charset="0"/>
         <a:buChar char="•"/>
-        <a:defRPr sz="2160" kern="1200">
+        <a:defRPr sz="1890" kern="1200">
           <a:solidFill>
             <a:schemeClr val="tx1"/>
           </a:solidFill>
@@ -2782,16 +2782,16 @@
           <a:cs typeface="+mn-cs"/>
         </a:defRPr>
       </a:lvl5pPr>
-      <a:lvl6pPr marL="3017520" indent="-274320" algn="l" defTabSz="1097280" rtl="0" eaLnBrk="1" latinLnBrk="0" hangingPunct="1">
+      <a:lvl6pPr marL="2640330" indent="-240030" algn="l" defTabSz="960120" rtl="0" eaLnBrk="1" latinLnBrk="0" hangingPunct="1">
         <a:lnSpc>
           <a:spcPct val="90000"/>
         </a:lnSpc>
         <a:spcBef>
-          <a:spcPts val="600"/>
+          <a:spcPts val="525"/>
         </a:spcBef>
         <a:buFont typeface="Arial" panose="020B0604020202020204" pitchFamily="34" charset="0"/>
         <a:buChar char="•"/>
-        <a:defRPr sz="2160" kern="1200">
+        <a:defRPr sz="1890" kern="1200">
           <a:solidFill>
             <a:schemeClr val="tx1"/>
           </a:solidFill>
@@ -2800,16 +2800,16 @@
           <a:cs typeface="+mn-cs"/>
         </a:defRPr>
       </a:lvl6pPr>
-      <a:lvl7pPr marL="3566160" indent="-274320" algn="l" defTabSz="1097280" rtl="0" eaLnBrk="1" latinLnBrk="0" hangingPunct="1">
+      <a:lvl7pPr marL="3120390" indent="-240030" algn="l" defTabSz="960120" rtl="0" eaLnBrk="1" latinLnBrk="0" hangingPunct="1">
         <a:lnSpc>
           <a:spcPct val="90000"/>
         </a:lnSpc>
         <a:spcBef>
-          <a:spcPts val="600"/>
+          <a:spcPts val="525"/>
         </a:spcBef>
         <a:buFont typeface="Arial" panose="020B0604020202020204" pitchFamily="34" charset="0"/>
         <a:buChar char="•"/>
-        <a:defRPr sz="2160" kern="1200">
+        <a:defRPr sz="1890" kern="1200">
           <a:solidFill>
             <a:schemeClr val="tx1"/>
           </a:solidFill>
@@ -2818,16 +2818,16 @@
           <a:cs typeface="+mn-cs"/>
         </a:defRPr>
       </a:lvl7pPr>
-      <a:lvl8pPr marL="4114800" indent="-274320" algn="l" defTabSz="1097280" rtl="0" eaLnBrk="1" latinLnBrk="0" hangingPunct="1">
+      <a:lvl8pPr marL="3600450" indent="-240030" algn="l" defTabSz="960120" rtl="0" eaLnBrk="1" latinLnBrk="0" hangingPunct="1">
         <a:lnSpc>
           <a:spcPct val="90000"/>
         </a:lnSpc>
         <a:spcBef>
-          <a:spcPts val="600"/>
+          <a:spcPts val="525"/>
         </a:spcBef>
         <a:buFont typeface="Arial" panose="020B0604020202020204" pitchFamily="34" charset="0"/>
         <a:buChar char="•"/>
-        <a:defRPr sz="2160" kern="1200">
+        <a:defRPr sz="1890" kern="1200">
           <a:solidFill>
             <a:schemeClr val="tx1"/>
           </a:solidFill>
@@ -2836,16 +2836,16 @@
           <a:cs typeface="+mn-cs"/>
         </a:defRPr>
       </a:lvl8pPr>
-      <a:lvl9pPr marL="4663440" indent="-274320" algn="l" defTabSz="1097280" rtl="0" eaLnBrk="1" latinLnBrk="0" hangingPunct="1">
+      <a:lvl9pPr marL="4080510" indent="-240030" algn="l" defTabSz="960120" rtl="0" eaLnBrk="1" latinLnBrk="0" hangingPunct="1">
         <a:lnSpc>
           <a:spcPct val="90000"/>
         </a:lnSpc>
         <a:spcBef>
-          <a:spcPts val="600"/>
+          <a:spcPts val="525"/>
         </a:spcBef>
         <a:buFont typeface="Arial" panose="020B0604020202020204" pitchFamily="34" charset="0"/>
         <a:buChar char="•"/>
-        <a:defRPr sz="2160" kern="1200">
+        <a:defRPr sz="1890" kern="1200">
           <a:solidFill>
             <a:schemeClr val="tx1"/>
           </a:solidFill>
@@ -2859,8 +2859,8 @@
       <a:defPPr>
         <a:defRPr lang="en-US"/>
       </a:defPPr>
-      <a:lvl1pPr marL="0" algn="l" defTabSz="1097280" rtl="0" eaLnBrk="1" latinLnBrk="0" hangingPunct="1">
-        <a:defRPr sz="2160" kern="1200">
+      <a:lvl1pPr marL="0" algn="l" defTabSz="960120" rtl="0" eaLnBrk="1" latinLnBrk="0" hangingPunct="1">
+        <a:defRPr sz="1890" kern="1200">
           <a:solidFill>
             <a:schemeClr val="tx1"/>
           </a:solidFill>
@@ -2869,8 +2869,8 @@
           <a:cs typeface="+mn-cs"/>
         </a:defRPr>
       </a:lvl1pPr>
-      <a:lvl2pPr marL="548640" algn="l" defTabSz="1097280" rtl="0" eaLnBrk="1" latinLnBrk="0" hangingPunct="1">
-        <a:defRPr sz="2160" kern="1200">
+      <a:lvl2pPr marL="480060" algn="l" defTabSz="960120" rtl="0" eaLnBrk="1" latinLnBrk="0" hangingPunct="1">
+        <a:defRPr sz="1890" kern="1200">
           <a:solidFill>
             <a:schemeClr val="tx1"/>
           </a:solidFill>
@@ -2879,8 +2879,8 @@
           <a:cs typeface="+mn-cs"/>
         </a:defRPr>
       </a:lvl2pPr>
-      <a:lvl3pPr marL="1097280" algn="l" defTabSz="1097280" rtl="0" eaLnBrk="1" latinLnBrk="0" hangingPunct="1">
-        <a:defRPr sz="2160" kern="1200">
+      <a:lvl3pPr marL="960120" algn="l" defTabSz="960120" rtl="0" eaLnBrk="1" latinLnBrk="0" hangingPunct="1">
+        <a:defRPr sz="1890" kern="1200">
           <a:solidFill>
             <a:schemeClr val="tx1"/>
           </a:solidFill>
@@ -2889,8 +2889,8 @@
           <a:cs typeface="+mn-cs"/>
         </a:defRPr>
       </a:lvl3pPr>
-      <a:lvl4pPr marL="1645920" algn="l" defTabSz="1097280" rtl="0" eaLnBrk="1" latinLnBrk="0" hangingPunct="1">
-        <a:defRPr sz="2160" kern="1200">
+      <a:lvl4pPr marL="1440180" algn="l" defTabSz="960120" rtl="0" eaLnBrk="1" latinLnBrk="0" hangingPunct="1">
+        <a:defRPr sz="1890" kern="1200">
           <a:solidFill>
             <a:schemeClr val="tx1"/>
           </a:solidFill>
@@ -2899,8 +2899,8 @@
           <a:cs typeface="+mn-cs"/>
         </a:defRPr>
       </a:lvl4pPr>
-      <a:lvl5pPr marL="2194560" algn="l" defTabSz="1097280" rtl="0" eaLnBrk="1" latinLnBrk="0" hangingPunct="1">
-        <a:defRPr sz="2160" kern="1200">
+      <a:lvl5pPr marL="1920240" algn="l" defTabSz="960120" rtl="0" eaLnBrk="1" latinLnBrk="0" hangingPunct="1">
+        <a:defRPr sz="1890" kern="1200">
           <a:solidFill>
             <a:schemeClr val="tx1"/>
           </a:solidFill>
@@ -2909,8 +2909,8 @@
           <a:cs typeface="+mn-cs"/>
         </a:defRPr>
       </a:lvl5pPr>
-      <a:lvl6pPr marL="2743200" algn="l" defTabSz="1097280" rtl="0" eaLnBrk="1" latinLnBrk="0" hangingPunct="1">
-        <a:defRPr sz="2160" kern="1200">
+      <a:lvl6pPr marL="2400300" algn="l" defTabSz="960120" rtl="0" eaLnBrk="1" latinLnBrk="0" hangingPunct="1">
+        <a:defRPr sz="1890" kern="1200">
           <a:solidFill>
             <a:schemeClr val="tx1"/>
           </a:solidFill>
@@ -2919,8 +2919,8 @@
           <a:cs typeface="+mn-cs"/>
         </a:defRPr>
       </a:lvl6pPr>
-      <a:lvl7pPr marL="3291840" algn="l" defTabSz="1097280" rtl="0" eaLnBrk="1" latinLnBrk="0" hangingPunct="1">
-        <a:defRPr sz="2160" kern="1200">
+      <a:lvl7pPr marL="2880360" algn="l" defTabSz="960120" rtl="0" eaLnBrk="1" latinLnBrk="0" hangingPunct="1">
+        <a:defRPr sz="1890" kern="1200">
           <a:solidFill>
             <a:schemeClr val="tx1"/>
           </a:solidFill>
@@ -2929,8 +2929,8 @@
           <a:cs typeface="+mn-cs"/>
         </a:defRPr>
       </a:lvl7pPr>
-      <a:lvl8pPr marL="3840480" algn="l" defTabSz="1097280" rtl="0" eaLnBrk="1" latinLnBrk="0" hangingPunct="1">
-        <a:defRPr sz="2160" kern="1200">
+      <a:lvl8pPr marL="3360420" algn="l" defTabSz="960120" rtl="0" eaLnBrk="1" latinLnBrk="0" hangingPunct="1">
+        <a:defRPr sz="1890" kern="1200">
           <a:solidFill>
             <a:schemeClr val="tx1"/>
           </a:solidFill>
@@ -2939,8 +2939,8 @@
           <a:cs typeface="+mn-cs"/>
         </a:defRPr>
       </a:lvl8pPr>
-      <a:lvl9pPr marL="4389120" algn="l" defTabSz="1097280" rtl="0" eaLnBrk="1" latinLnBrk="0" hangingPunct="1">
-        <a:defRPr sz="2160" kern="1200">
+      <a:lvl9pPr marL="3840480" algn="l" defTabSz="960120" rtl="0" eaLnBrk="1" latinLnBrk="0" hangingPunct="1">
+        <a:defRPr sz="1890" kern="1200">
           <a:solidFill>
             <a:schemeClr val="tx1"/>
           </a:solidFill>
@@ -2973,10 +2973,10 @@
       </p:grpSpPr>
       <p:pic>
         <p:nvPicPr>
-          <p:cNvPr id="59" name="Picture 58">
+          <p:cNvPr id="4" name="Picture 3">
             <a:extLst>
               <a:ext uri="{FF2B5EF4-FFF2-40B4-BE49-F238E27FC236}">
-                <a16:creationId xmlns:a16="http://schemas.microsoft.com/office/drawing/2014/main" id="{65F48154-3021-448D-B0FB-D71F897C0D5B}"/>
+                <a16:creationId xmlns:a16="http://schemas.microsoft.com/office/drawing/2014/main" id="{62425618-D263-4848-9A2B-B486D5282B50}"/>
               </a:ext>
             </a:extLst>
           </p:cNvPr>
@@ -2993,8 +2993,8 @@
         </p:blipFill>
         <p:spPr>
           <a:xfrm>
-            <a:off x="1002175" y="4670376"/>
-            <a:ext cx="4247777" cy="3887287"/>
+            <a:off x="4410920" y="4173370"/>
+            <a:ext cx="5010912" cy="4818595"/>
           </a:xfrm>
           <a:prstGeom prst="rect">
             <a:avLst/>
@@ -3003,10 +3003,10 @@
       </p:pic>
       <p:pic>
         <p:nvPicPr>
-          <p:cNvPr id="36" name="Picture 35">
+          <p:cNvPr id="7" name="Picture 6">
             <a:extLst>
               <a:ext uri="{FF2B5EF4-FFF2-40B4-BE49-F238E27FC236}">
-                <a16:creationId xmlns:a16="http://schemas.microsoft.com/office/drawing/2014/main" id="{00C0A54C-8D95-4625-B671-9E47DF3752FB}"/>
+                <a16:creationId xmlns:a16="http://schemas.microsoft.com/office/drawing/2014/main" id="{A1E1E773-8F92-4C41-9E3D-02194189C6E4}"/>
               </a:ext>
             </a:extLst>
           </p:cNvPr>
@@ -3023,20 +3023,100 @@
         </p:blipFill>
         <p:spPr>
           <a:xfrm>
-            <a:off x="1000084" y="586741"/>
-            <a:ext cx="4251960" cy="3891115"/>
+            <a:off x="4410923" y="-201958"/>
+            <a:ext cx="5007429" cy="4815246"/>
           </a:xfrm>
           <a:prstGeom prst="rect">
             <a:avLst/>
           </a:prstGeom>
         </p:spPr>
       </p:pic>
+      <p:sp>
+        <p:nvSpPr>
+          <p:cNvPr id="14" name="TextBox 13">
+            <a:extLst>
+              <a:ext uri="{FF2B5EF4-FFF2-40B4-BE49-F238E27FC236}">
+                <a16:creationId xmlns:a16="http://schemas.microsoft.com/office/drawing/2014/main" id="{55335750-2F55-42D1-B322-7FFE0A303D52}"/>
+              </a:ext>
+            </a:extLst>
+          </p:cNvPr>
+          <p:cNvSpPr txBox="1"/>
+          <p:nvPr/>
+        </p:nvSpPr>
+        <p:spPr>
+          <a:xfrm>
+            <a:off x="4315612" y="159886"/>
+            <a:ext cx="372218" cy="446276"/>
+          </a:xfrm>
+          <a:prstGeom prst="rect">
+            <a:avLst/>
+          </a:prstGeom>
+          <a:noFill/>
+        </p:spPr>
+        <p:txBody>
+          <a:bodyPr wrap="none" rtlCol="0">
+            <a:spAutoFit/>
+          </a:bodyPr>
+          <a:lstStyle/>
+          <a:p>
+            <a:r>
+              <a:rPr lang="en-US" sz="2300" dirty="0">
+                <a:solidFill>
+                  <a:srgbClr val="050A38"/>
+                </a:solidFill>
+                <a:latin typeface="Manrope ExtraBold" pitchFamily="2" charset="0"/>
+              </a:rPr>
+              <a:t>B</a:t>
+            </a:r>
+          </a:p>
+        </p:txBody>
+      </p:sp>
+      <p:sp>
+        <p:nvSpPr>
+          <p:cNvPr id="15" name="TextBox 14">
+            <a:extLst>
+              <a:ext uri="{FF2B5EF4-FFF2-40B4-BE49-F238E27FC236}">
+                <a16:creationId xmlns:a16="http://schemas.microsoft.com/office/drawing/2014/main" id="{66ABA122-512F-4C57-BD30-375BA30DD933}"/>
+              </a:ext>
+            </a:extLst>
+          </p:cNvPr>
+          <p:cNvSpPr txBox="1"/>
+          <p:nvPr/>
+        </p:nvSpPr>
+        <p:spPr>
+          <a:xfrm>
+            <a:off x="4315614" y="4532046"/>
+            <a:ext cx="394660" cy="446276"/>
+          </a:xfrm>
+          <a:prstGeom prst="rect">
+            <a:avLst/>
+          </a:prstGeom>
+          <a:noFill/>
+        </p:spPr>
+        <p:txBody>
+          <a:bodyPr wrap="none" rtlCol="0">
+            <a:spAutoFit/>
+          </a:bodyPr>
+          <a:lstStyle/>
+          <a:p>
+            <a:r>
+              <a:rPr lang="en-US" sz="2300" dirty="0">
+                <a:solidFill>
+                  <a:srgbClr val="050A38"/>
+                </a:solidFill>
+                <a:latin typeface="Manrope ExtraBold" pitchFamily="2" charset="0"/>
+              </a:rPr>
+              <a:t>D</a:t>
+            </a:r>
+          </a:p>
+        </p:txBody>
+      </p:sp>
       <p:pic>
         <p:nvPicPr>
-          <p:cNvPr id="34" name="Picture 33">
+          <p:cNvPr id="3" name="Picture 2">
             <a:extLst>
               <a:ext uri="{FF2B5EF4-FFF2-40B4-BE49-F238E27FC236}">
-                <a16:creationId xmlns:a16="http://schemas.microsoft.com/office/drawing/2014/main" id="{B61C131C-588F-4B8B-B9BF-2B70B01D80B2}"/>
+                <a16:creationId xmlns:a16="http://schemas.microsoft.com/office/drawing/2014/main" id="{951CA2B2-C234-4C3B-BB2A-9164AC67ABC1}"/>
               </a:ext>
             </a:extLst>
           </p:cNvPr>
@@ -3053,8 +3133,38 @@
         </p:blipFill>
         <p:spPr>
           <a:xfrm>
-            <a:off x="5523080" y="165258"/>
-            <a:ext cx="5070301" cy="4640007"/>
+            <a:off x="338438" y="152035"/>
+            <a:ext cx="3914837" cy="4327430"/>
+          </a:xfrm>
+          <a:prstGeom prst="rect">
+            <a:avLst/>
+          </a:prstGeom>
+        </p:spPr>
+      </p:pic>
+      <p:pic>
+        <p:nvPicPr>
+          <p:cNvPr id="5" name="Picture 4">
+            <a:extLst>
+              <a:ext uri="{FF2B5EF4-FFF2-40B4-BE49-F238E27FC236}">
+                <a16:creationId xmlns:a16="http://schemas.microsoft.com/office/drawing/2014/main" id="{0C1DF98D-64AD-47B0-91D8-2259C0580247}"/>
+              </a:ext>
+            </a:extLst>
+          </p:cNvPr>
+          <p:cNvPicPr>
+            <a:picLocks noChangeAspect="1"/>
+          </p:cNvPicPr>
+          <p:nvPr/>
+        </p:nvPicPr>
+        <p:blipFill>
+          <a:blip r:embed="rId5"/>
+          <a:stretch>
+            <a:fillRect/>
+          </a:stretch>
+        </p:blipFill>
+        <p:spPr>
+          <a:xfrm>
+            <a:off x="338438" y="4567254"/>
+            <a:ext cx="3913632" cy="4326098"/>
           </a:xfrm>
           <a:prstGeom prst="rect">
             <a:avLst/>
@@ -3075,7 +3185,7 @@
         </p:nvSpPr>
         <p:spPr>
           <a:xfrm>
-            <a:off x="379418" y="584355"/>
+            <a:off x="309441" y="152035"/>
             <a:ext cx="386644" cy="446276"/>
           </a:xfrm>
           <a:prstGeom prst="rect">
@@ -3115,7 +3225,7 @@
         </p:nvSpPr>
         <p:spPr>
           <a:xfrm>
-            <a:off x="379419" y="4670376"/>
+            <a:off x="309442" y="4524194"/>
             <a:ext cx="404278" cy="446276"/>
           </a:xfrm>
           <a:prstGeom prst="rect">
@@ -3143,10 +3253,10 @@
       </p:sp>
       <p:sp>
         <p:nvSpPr>
-          <p:cNvPr id="14" name="TextBox 13">
+          <p:cNvPr id="16" name="TextBox 15">
             <a:extLst>
               <a:ext uri="{FF2B5EF4-FFF2-40B4-BE49-F238E27FC236}">
-                <a16:creationId xmlns:a16="http://schemas.microsoft.com/office/drawing/2014/main" id="{55335750-2F55-42D1-B322-7FFE0A303D52}"/>
+                <a16:creationId xmlns:a16="http://schemas.microsoft.com/office/drawing/2014/main" id="{8B4D9B3E-3834-49FC-81FA-CDE304C98C4A}"/>
               </a:ext>
             </a:extLst>
           </p:cNvPr>
@@ -3155,88 +3265,8 @@
         </p:nvSpPr>
         <p:spPr>
           <a:xfrm>
-            <a:off x="5391092" y="500813"/>
-            <a:ext cx="372218" cy="446276"/>
-          </a:xfrm>
-          <a:prstGeom prst="rect">
-            <a:avLst/>
-          </a:prstGeom>
-          <a:noFill/>
-        </p:spPr>
-        <p:txBody>
-          <a:bodyPr wrap="none" rtlCol="0">
-            <a:spAutoFit/>
-          </a:bodyPr>
-          <a:lstStyle/>
-          <a:p>
-            <a:r>
-              <a:rPr lang="en-US" sz="2300" dirty="0">
-                <a:solidFill>
-                  <a:srgbClr val="050A38"/>
-                </a:solidFill>
-                <a:latin typeface="Manrope ExtraBold" pitchFamily="2" charset="0"/>
-              </a:rPr>
-              <a:t>B</a:t>
-            </a:r>
-          </a:p>
-        </p:txBody>
-      </p:sp>
-      <p:sp>
-        <p:nvSpPr>
-          <p:cNvPr id="15" name="TextBox 14">
-            <a:extLst>
-              <a:ext uri="{FF2B5EF4-FFF2-40B4-BE49-F238E27FC236}">
-                <a16:creationId xmlns:a16="http://schemas.microsoft.com/office/drawing/2014/main" id="{66ABA122-512F-4C57-BD30-375BA30DD933}"/>
-              </a:ext>
-            </a:extLst>
-          </p:cNvPr>
-          <p:cNvSpPr txBox="1"/>
-          <p:nvPr/>
-        </p:nvSpPr>
-        <p:spPr>
-          <a:xfrm>
-            <a:off x="5391094" y="4586835"/>
-            <a:ext cx="394660" cy="446276"/>
-          </a:xfrm>
-          <a:prstGeom prst="rect">
-            <a:avLst/>
-          </a:prstGeom>
-          <a:noFill/>
-        </p:spPr>
-        <p:txBody>
-          <a:bodyPr wrap="none" rtlCol="0">
-            <a:spAutoFit/>
-          </a:bodyPr>
-          <a:lstStyle/>
-          <a:p>
-            <a:r>
-              <a:rPr lang="en-US" sz="2300" dirty="0">
-                <a:solidFill>
-                  <a:srgbClr val="050A38"/>
-                </a:solidFill>
-                <a:latin typeface="Manrope ExtraBold" pitchFamily="2" charset="0"/>
-              </a:rPr>
-              <a:t>D</a:t>
-            </a:r>
-          </a:p>
-        </p:txBody>
-      </p:sp>
-      <p:sp>
-        <p:nvSpPr>
-          <p:cNvPr id="42" name="TextBox 41">
-            <a:extLst>
-              <a:ext uri="{FF2B5EF4-FFF2-40B4-BE49-F238E27FC236}">
-                <a16:creationId xmlns:a16="http://schemas.microsoft.com/office/drawing/2014/main" id="{6203F3EA-B5BC-44F1-9537-B6D18EBA7AC9}"/>
-              </a:ext>
-            </a:extLst>
-          </p:cNvPr>
-          <p:cNvSpPr txBox="1"/>
-          <p:nvPr/>
-        </p:nvSpPr>
-        <p:spPr>
-          <a:xfrm>
-            <a:off x="8859176" y="1320362"/>
-            <a:ext cx="307906" cy="369332"/>
+            <a:off x="6773177" y="320372"/>
+            <a:ext cx="279915" cy="369332"/>
           </a:xfrm>
           <a:prstGeom prst="rect">
             <a:avLst/>
@@ -3265,10 +3295,10 @@
       </p:sp>
       <p:sp>
         <p:nvSpPr>
-          <p:cNvPr id="43" name="TextBox 42">
+          <p:cNvPr id="17" name="TextBox 16">
             <a:extLst>
               <a:ext uri="{FF2B5EF4-FFF2-40B4-BE49-F238E27FC236}">
-                <a16:creationId xmlns:a16="http://schemas.microsoft.com/office/drawing/2014/main" id="{81C35A7E-453C-4C80-9DAC-C7C3259E7AAE}"/>
+                <a16:creationId xmlns:a16="http://schemas.microsoft.com/office/drawing/2014/main" id="{20D4E907-24FE-473C-BE2A-893224B17524}"/>
               </a:ext>
             </a:extLst>
           </p:cNvPr>
@@ -3277,7 +3307,7 @@
         </p:nvSpPr>
         <p:spPr>
           <a:xfrm>
-            <a:off x="8233350" y="1304499"/>
+            <a:off x="7825727" y="2062204"/>
             <a:ext cx="279915" cy="369332"/>
           </a:xfrm>
           <a:prstGeom prst="rect">
@@ -3307,10 +3337,10 @@
       </p:sp>
       <p:sp>
         <p:nvSpPr>
-          <p:cNvPr id="45" name="TextBox 44">
+          <p:cNvPr id="18" name="TextBox 17">
             <a:extLst>
               <a:ext uri="{FF2B5EF4-FFF2-40B4-BE49-F238E27FC236}">
-                <a16:creationId xmlns:a16="http://schemas.microsoft.com/office/drawing/2014/main" id="{2DEC89E3-4AF7-4B34-99F9-CE116484ED9B}"/>
+                <a16:creationId xmlns:a16="http://schemas.microsoft.com/office/drawing/2014/main" id="{84472659-ECD7-4BEF-AE07-F8D862878C98}"/>
               </a:ext>
             </a:extLst>
           </p:cNvPr>
@@ -3319,7 +3349,7 @@
         </p:nvSpPr>
         <p:spPr>
           <a:xfrm>
-            <a:off x="7796977" y="2875152"/>
+            <a:off x="7733099" y="999498"/>
             <a:ext cx="279915" cy="369332"/>
           </a:xfrm>
           <a:prstGeom prst="rect">
@@ -3349,10 +3379,10 @@
       </p:sp>
       <p:sp>
         <p:nvSpPr>
-          <p:cNvPr id="46" name="TextBox 45">
+          <p:cNvPr id="19" name="TextBox 18">
             <a:extLst>
               <a:ext uri="{FF2B5EF4-FFF2-40B4-BE49-F238E27FC236}">
-                <a16:creationId xmlns:a16="http://schemas.microsoft.com/office/drawing/2014/main" id="{059916C1-C2A1-43E8-81BF-3C0452E17F06}"/>
+                <a16:creationId xmlns:a16="http://schemas.microsoft.com/office/drawing/2014/main" id="{E9CE3360-F169-4A7E-A968-28B4B7814F1E}"/>
               </a:ext>
             </a:extLst>
           </p:cNvPr>
@@ -3361,7 +3391,7 @@
         </p:nvSpPr>
         <p:spPr>
           <a:xfrm>
-            <a:off x="6956878" y="1323161"/>
+            <a:off x="7080558" y="999498"/>
             <a:ext cx="279915" cy="369332"/>
           </a:xfrm>
           <a:prstGeom prst="rect">
@@ -3391,10 +3421,10 @@
       </p:sp>
       <p:sp>
         <p:nvSpPr>
-          <p:cNvPr id="47" name="TextBox 46">
+          <p:cNvPr id="20" name="TextBox 19">
             <a:extLst>
               <a:ext uri="{FF2B5EF4-FFF2-40B4-BE49-F238E27FC236}">
-                <a16:creationId xmlns:a16="http://schemas.microsoft.com/office/drawing/2014/main" id="{CBB4EAD7-BF85-49F2-BE47-7EB8289830B8}"/>
+                <a16:creationId xmlns:a16="http://schemas.microsoft.com/office/drawing/2014/main" id="{63FDB53E-8C29-40C9-95AB-90F061C09655}"/>
               </a:ext>
             </a:extLst>
           </p:cNvPr>
@@ -3403,7 +3433,7 @@
         </p:nvSpPr>
         <p:spPr>
           <a:xfrm>
-            <a:off x="7918272" y="682822"/>
+            <a:off x="6655215" y="2600688"/>
             <a:ext cx="279915" cy="369332"/>
           </a:xfrm>
           <a:prstGeom prst="rect">
@@ -3433,10 +3463,10 @@
       </p:sp>
       <p:sp>
         <p:nvSpPr>
-          <p:cNvPr id="48" name="TextBox 47">
+          <p:cNvPr id="22" name="TextBox 21">
             <a:extLst>
               <a:ext uri="{FF2B5EF4-FFF2-40B4-BE49-F238E27FC236}">
-                <a16:creationId xmlns:a16="http://schemas.microsoft.com/office/drawing/2014/main" id="{64371635-160A-4796-8C72-75DA3C4DFB5D}"/>
+                <a16:creationId xmlns:a16="http://schemas.microsoft.com/office/drawing/2014/main" id="{5225E4D3-8C45-4E9F-BC42-6711D16307FA}"/>
               </a:ext>
             </a:extLst>
           </p:cNvPr>
@@ -3445,7 +3475,7 @@
         </p:nvSpPr>
         <p:spPr>
           <a:xfrm>
-            <a:off x="8966474" y="2347633"/>
+            <a:off x="5826713" y="999498"/>
             <a:ext cx="279915" cy="369332"/>
           </a:xfrm>
           <a:prstGeom prst="rect">
@@ -3475,10 +3505,10 @@
       </p:sp>
       <p:sp>
         <p:nvSpPr>
-          <p:cNvPr id="49" name="TextBox 48">
+          <p:cNvPr id="23" name="TextBox 22">
             <a:extLst>
               <a:ext uri="{FF2B5EF4-FFF2-40B4-BE49-F238E27FC236}">
-                <a16:creationId xmlns:a16="http://schemas.microsoft.com/office/drawing/2014/main" id="{E493D758-170E-438A-9560-DDCA8BB3E3A6}"/>
+                <a16:creationId xmlns:a16="http://schemas.microsoft.com/office/drawing/2014/main" id="{628CBCBC-C352-483E-8EFF-99E537C7CE61}"/>
               </a:ext>
             </a:extLst>
           </p:cNvPr>
@@ -3487,8 +3517,8 @@
         </p:nvSpPr>
         <p:spPr>
           <a:xfrm>
-            <a:off x="6834401" y="2356964"/>
-            <a:ext cx="319711" cy="369332"/>
+            <a:off x="5734086" y="2062204"/>
+            <a:ext cx="279915" cy="369332"/>
           </a:xfrm>
           <a:prstGeom prst="rect">
             <a:avLst/>
@@ -3515,53 +3545,12 @@
           </a:p>
         </p:txBody>
       </p:sp>
-      <p:pic>
-        <p:nvPicPr>
-          <p:cNvPr id="39" name="Picture 38">
+      <p:sp>
+        <p:nvSpPr>
+          <p:cNvPr id="31" name="TextBox 30">
             <a:extLst>
               <a:ext uri="{FF2B5EF4-FFF2-40B4-BE49-F238E27FC236}">
-                <a16:creationId xmlns:a16="http://schemas.microsoft.com/office/drawing/2014/main" id="{3490C847-7A67-45AA-8C96-86B9A0EC33D3}"/>
-              </a:ext>
-            </a:extLst>
-          </p:cNvPr>
-          <p:cNvPicPr>
-            <a:picLocks noChangeAspect="1"/>
-          </p:cNvPicPr>
-          <p:nvPr/>
-        </p:nvPicPr>
-        <p:blipFill>
-          <a:blip r:embed="rId5">
-            <a:clrChange>
-              <a:clrFrom>
-                <a:srgbClr val="FFFFFF"/>
-              </a:clrFrom>
-              <a:clrTo>
-                <a:srgbClr val="FFFFFF">
-                  <a:alpha val="0"/>
-                </a:srgbClr>
-              </a:clrTo>
-            </a:clrChange>
-          </a:blip>
-          <a:stretch>
-            <a:fillRect/>
-          </a:stretch>
-        </p:blipFill>
-        <p:spPr>
-          <a:xfrm>
-            <a:off x="5523080" y="4237400"/>
-            <a:ext cx="5065931" cy="4636008"/>
-          </a:xfrm>
-          <a:prstGeom prst="rect">
-            <a:avLst/>
-          </a:prstGeom>
-        </p:spPr>
-      </p:pic>
-      <p:sp>
-        <p:nvSpPr>
-          <p:cNvPr id="50" name="TextBox 49">
-            <a:extLst>
-              <a:ext uri="{FF2B5EF4-FFF2-40B4-BE49-F238E27FC236}">
-                <a16:creationId xmlns:a16="http://schemas.microsoft.com/office/drawing/2014/main" id="{08364126-1C47-41FB-9B3E-817412C93144}"/>
+                <a16:creationId xmlns:a16="http://schemas.microsoft.com/office/drawing/2014/main" id="{BA4C4257-B7B0-4586-A814-6DDF9744404C}"/>
               </a:ext>
             </a:extLst>
           </p:cNvPr>
@@ -3570,8 +3559,8 @@
         </p:nvSpPr>
         <p:spPr>
           <a:xfrm>
-            <a:off x="7918272" y="4746257"/>
-            <a:ext cx="307906" cy="369332"/>
+            <a:off x="6772423" y="4692306"/>
+            <a:ext cx="279915" cy="369332"/>
           </a:xfrm>
           <a:prstGeom prst="rect">
             <a:avLst/>
@@ -3600,10 +3589,10 @@
       </p:sp>
       <p:sp>
         <p:nvSpPr>
-          <p:cNvPr id="51" name="TextBox 50">
+          <p:cNvPr id="32" name="TextBox 31">
             <a:extLst>
               <a:ext uri="{FF2B5EF4-FFF2-40B4-BE49-F238E27FC236}">
-                <a16:creationId xmlns:a16="http://schemas.microsoft.com/office/drawing/2014/main" id="{EA1E83D9-98B4-4735-8226-A7466D518A76}"/>
+                <a16:creationId xmlns:a16="http://schemas.microsoft.com/office/drawing/2014/main" id="{EDDDE7A6-BBDB-4FA3-9915-03AF818AB67F}"/>
               </a:ext>
             </a:extLst>
           </p:cNvPr>
@@ -3612,8 +3601,8 @@
         </p:nvSpPr>
         <p:spPr>
           <a:xfrm>
-            <a:off x="8966474" y="6419775"/>
-            <a:ext cx="307906" cy="369332"/>
+            <a:off x="7824973" y="6434138"/>
+            <a:ext cx="279915" cy="369332"/>
           </a:xfrm>
           <a:prstGeom prst="rect">
             <a:avLst/>
@@ -3642,10 +3631,10 @@
       </p:sp>
       <p:sp>
         <p:nvSpPr>
-          <p:cNvPr id="52" name="TextBox 51">
+          <p:cNvPr id="33" name="TextBox 32">
             <a:extLst>
               <a:ext uri="{FF2B5EF4-FFF2-40B4-BE49-F238E27FC236}">
-                <a16:creationId xmlns:a16="http://schemas.microsoft.com/office/drawing/2014/main" id="{AED94A78-0ACD-4FF0-A669-CEC774D7B98C}"/>
+                <a16:creationId xmlns:a16="http://schemas.microsoft.com/office/drawing/2014/main" id="{1E8A7C70-CAAD-4E0C-B2DC-3EA693B6730B}"/>
               </a:ext>
             </a:extLst>
           </p:cNvPr>
@@ -3654,8 +3643,8 @@
         </p:nvSpPr>
         <p:spPr>
           <a:xfrm>
-            <a:off x="8214690" y="5385972"/>
-            <a:ext cx="307906" cy="369332"/>
+            <a:off x="7732345" y="5371432"/>
+            <a:ext cx="279915" cy="369332"/>
           </a:xfrm>
           <a:prstGeom prst="rect">
             <a:avLst/>
@@ -3684,10 +3673,10 @@
       </p:sp>
       <p:sp>
         <p:nvSpPr>
-          <p:cNvPr id="53" name="TextBox 52">
+          <p:cNvPr id="34" name="TextBox 33">
             <a:extLst>
               <a:ext uri="{FF2B5EF4-FFF2-40B4-BE49-F238E27FC236}">
-                <a16:creationId xmlns:a16="http://schemas.microsoft.com/office/drawing/2014/main" id="{455B2A9A-3ED1-4D11-B453-DC668D7F794F}"/>
+                <a16:creationId xmlns:a16="http://schemas.microsoft.com/office/drawing/2014/main" id="{40CE1580-7E9D-4B22-AACA-188CCAEAD822}"/>
               </a:ext>
             </a:extLst>
           </p:cNvPr>
@@ -3696,8 +3685,8 @@
         </p:nvSpPr>
         <p:spPr>
           <a:xfrm>
-            <a:off x="8868507" y="5395303"/>
-            <a:ext cx="307906" cy="369332"/>
+            <a:off x="7079804" y="5371432"/>
+            <a:ext cx="279915" cy="369332"/>
           </a:xfrm>
           <a:prstGeom prst="rect">
             <a:avLst/>
@@ -3726,10 +3715,10 @@
       </p:sp>
       <p:sp>
         <p:nvSpPr>
-          <p:cNvPr id="54" name="TextBox 53">
+          <p:cNvPr id="35" name="TextBox 34">
             <a:extLst>
               <a:ext uri="{FF2B5EF4-FFF2-40B4-BE49-F238E27FC236}">
-                <a16:creationId xmlns:a16="http://schemas.microsoft.com/office/drawing/2014/main" id="{14DB85FA-DEED-411D-BA1E-F9734917D014}"/>
+                <a16:creationId xmlns:a16="http://schemas.microsoft.com/office/drawing/2014/main" id="{DED2CF9D-1C5A-468E-B5E8-5085ACA75739}"/>
               </a:ext>
             </a:extLst>
           </p:cNvPr>
@@ -3738,8 +3727,8 @@
         </p:nvSpPr>
         <p:spPr>
           <a:xfrm>
-            <a:off x="8018167" y="6934400"/>
-            <a:ext cx="307906" cy="369332"/>
+            <a:off x="6654461" y="6972622"/>
+            <a:ext cx="279915" cy="369332"/>
           </a:xfrm>
           <a:prstGeom prst="rect">
             <a:avLst/>
@@ -3768,10 +3757,10 @@
       </p:sp>
       <p:sp>
         <p:nvSpPr>
-          <p:cNvPr id="55" name="TextBox 54">
+          <p:cNvPr id="36" name="TextBox 35">
             <a:extLst>
               <a:ext uri="{FF2B5EF4-FFF2-40B4-BE49-F238E27FC236}">
-                <a16:creationId xmlns:a16="http://schemas.microsoft.com/office/drawing/2014/main" id="{2BAC4C8E-0D19-4621-AD76-E406559DAA9D}"/>
+                <a16:creationId xmlns:a16="http://schemas.microsoft.com/office/drawing/2014/main" id="{2A1D26EF-114A-4B91-AF70-05F7A65B9072}"/>
               </a:ext>
             </a:extLst>
           </p:cNvPr>
@@ -3780,8 +3769,8 @@
         </p:nvSpPr>
         <p:spPr>
           <a:xfrm>
-            <a:off x="7771221" y="6934185"/>
-            <a:ext cx="307906" cy="369332"/>
+            <a:off x="5825959" y="5371432"/>
+            <a:ext cx="279915" cy="369332"/>
           </a:xfrm>
           <a:prstGeom prst="rect">
             <a:avLst/>
@@ -3810,10 +3799,10 @@
       </p:sp>
       <p:sp>
         <p:nvSpPr>
-          <p:cNvPr id="56" name="TextBox 55">
+          <p:cNvPr id="37" name="TextBox 36">
             <a:extLst>
               <a:ext uri="{FF2B5EF4-FFF2-40B4-BE49-F238E27FC236}">
-                <a16:creationId xmlns:a16="http://schemas.microsoft.com/office/drawing/2014/main" id="{6DC57A46-BF69-4B0F-B7C0-528603E5C8A4}"/>
+                <a16:creationId xmlns:a16="http://schemas.microsoft.com/office/drawing/2014/main" id="{38C19932-25F8-4320-83D5-BC4490BFF13C}"/>
               </a:ext>
             </a:extLst>
           </p:cNvPr>
@@ -3822,8 +3811,8 @@
         </p:nvSpPr>
         <p:spPr>
           <a:xfrm>
-            <a:off x="6928887" y="5395303"/>
-            <a:ext cx="307906" cy="369332"/>
+            <a:off x="5733332" y="6434138"/>
+            <a:ext cx="279915" cy="369332"/>
           </a:xfrm>
           <a:prstGeom prst="rect">
             <a:avLst/>
@@ -3852,10 +3841,10 @@
       </p:sp>
       <p:sp>
         <p:nvSpPr>
-          <p:cNvPr id="57" name="TextBox 56">
+          <p:cNvPr id="39" name="TextBox 38">
             <a:extLst>
               <a:ext uri="{FF2B5EF4-FFF2-40B4-BE49-F238E27FC236}">
-                <a16:creationId xmlns:a16="http://schemas.microsoft.com/office/drawing/2014/main" id="{E7DBF931-DD7E-4B08-8A7A-5C3D2729C5BE}"/>
+                <a16:creationId xmlns:a16="http://schemas.microsoft.com/office/drawing/2014/main" id="{E44FC362-F03B-45A3-8C55-F2EB93C7270E}"/>
               </a:ext>
             </a:extLst>
           </p:cNvPr>
@@ -3864,8 +3853,8 @@
         </p:nvSpPr>
         <p:spPr>
           <a:xfrm>
-            <a:off x="6834401" y="6419775"/>
-            <a:ext cx="307906" cy="369332"/>
+            <a:off x="6897478" y="6970971"/>
+            <a:ext cx="279915" cy="369332"/>
           </a:xfrm>
           <a:prstGeom prst="rect">
             <a:avLst/>

</xml_diff>